<commit_message>
small power point edits
</commit_message>
<xml_diff>
--- a/Project_Presentation.pptx
+++ b/Project_Presentation.pptx
@@ -309,7 +309,7 @@
           <a:p>
             <a:fld id="{DB92F479-4B50-F243-9713-1B12EC2B4BDB}" type="datetimeFigureOut">
               <a:rPr lang="en-US" smtClean="0"/>
-              <a:t>12/1/2015</a:t>
+              <a:t>12/2/2015</a:t>
             </a:fld>
             <a:endParaRPr lang="en-US"/>
           </a:p>
@@ -9914,34 +9914,7 @@
                 </a:solidFill>
                 <a:latin typeface="Helvetica Neue"/>
               </a:rPr>
-              <a:t>Given this, I </a:t>
-            </a:r>
-            <a:r>
-              <a:rPr lang="en-US" sz="1800" dirty="0" smtClean="0">
-                <a:solidFill>
-                  <a:srgbClr val="000000"/>
-                </a:solidFill>
-                <a:latin typeface="Helvetica Neue"/>
-              </a:rPr>
-              <a:t>care about ‘high utilizers</a:t>
-            </a:r>
-            <a:r>
-              <a:rPr lang="en-US" sz="1800" dirty="0" smtClean="0">
-                <a:solidFill>
-                  <a:srgbClr val="000000"/>
-                </a:solidFill>
-                <a:latin typeface="Helvetica Neue"/>
-              </a:rPr>
-              <a:t>’, </a:t>
-            </a:r>
-            <a:r>
-              <a:rPr lang="en-US" sz="1800" dirty="0" smtClean="0">
-                <a:solidFill>
-                  <a:srgbClr val="000000"/>
-                </a:solidFill>
-                <a:latin typeface="Helvetica Neue"/>
-              </a:rPr>
-              <a:t>so I segmented the data into individuals with greater than 12 doctors visits and individuals with less than or equal to 12 doctors visits</a:t>
+              <a:t>Given this, I care about ‘high utilizers’, so I segmented the data into individuals with greater than 12 doctors visits and individuals with less than or equal to 12 doctors visits</a:t>
             </a:r>
           </a:p>
           <a:p>
@@ -9983,16 +9956,7 @@
                 </a:solidFill>
                 <a:latin typeface="Helvetica Neue"/>
               </a:rPr>
-              <a:t>of individuals had less than 12 doctors </a:t>
-            </a:r>
-            <a:r>
-              <a:rPr lang="en-US" sz="1800" dirty="0" smtClean="0">
-                <a:solidFill>
-                  <a:srgbClr val="000000"/>
-                </a:solidFill>
-                <a:latin typeface="Helvetica Neue"/>
-              </a:rPr>
-              <a:t>visits (~6.3% has more than 12 doctor’s visits)</a:t>
+              <a:t>of individuals had less than 12 doctors visits (~6.3% has more than 12 doctor’s visits)</a:t>
             </a:r>
           </a:p>
           <a:p>
@@ -10057,12 +10021,6 @@
               </a:rPr>
               <a:t>Unbalanced classifier</a:t>
             </a:r>
-            <a:endParaRPr lang="en-US" sz="1800" dirty="0" smtClean="0">
-              <a:solidFill>
-                <a:srgbClr val="000000"/>
-              </a:solidFill>
-              <a:latin typeface="Helvetica Neue"/>
-            </a:endParaRPr>
           </a:p>
         </p:txBody>
       </p:sp>
@@ -10526,7 +10484,6 @@
               <a:rPr lang="en-US" sz="1800" b="1" kern="0" dirty="0" smtClean="0"/>
               <a:t>Accuracy)</a:t>
             </a:r>
-            <a:endParaRPr lang="en-US" sz="1800" b="1" kern="0" dirty="0" smtClean="0"/>
           </a:p>
           <a:p>
             <a:pPr>
@@ -11772,7 +11729,6 @@
               <a:rPr lang="en-US" kern="0" dirty="0" smtClean="0"/>
               <a:t>Rate (Sensitivity)</a:t>
             </a:r>
-            <a:endParaRPr lang="en-US" kern="0" dirty="0" smtClean="0"/>
           </a:p>
           <a:p>
             <a:pPr marL="0" indent="0">
@@ -12944,7 +12900,11 @@
             </a:pPr>
             <a:r>
               <a:rPr lang="en-US" kern="0" dirty="0" smtClean="0"/>
-              <a:t>Unbiased classifier issue</a:t>
+              <a:t>Unbalanced </a:t>
+            </a:r>
+            <a:r>
+              <a:rPr lang="en-US" kern="0" dirty="0" smtClean="0"/>
+              <a:t>classifier issue</a:t>
             </a:r>
           </a:p>
           <a:p>
@@ -13415,11 +13375,7 @@
             </a:pPr>
             <a:r>
               <a:rPr lang="en-US" b="1" kern="0" dirty="0" smtClean="0"/>
-              <a:t>Next </a:t>
-            </a:r>
-            <a:r>
-              <a:rPr lang="en-US" b="1" kern="0" dirty="0" smtClean="0"/>
-              <a:t>Steps</a:t>
+              <a:t>Next Steps</a:t>
             </a:r>
           </a:p>
           <a:p>
@@ -13442,7 +13398,6 @@
               <a:rPr lang="en-US" kern="0" dirty="0" smtClean="0"/>
               <a:t>cleaning (i.e. feature exclusion)</a:t>
             </a:r>
-            <a:endParaRPr lang="en-US" kern="0" dirty="0" smtClean="0"/>
           </a:p>
           <a:p>
             <a:pPr>
@@ -13454,11 +13409,7 @@
             </a:pPr>
             <a:r>
               <a:rPr lang="en-US" kern="0" dirty="0" smtClean="0"/>
-              <a:t>Further adjustments </a:t>
-            </a:r>
-            <a:r>
-              <a:rPr lang="en-US" kern="0" dirty="0" smtClean="0"/>
-              <a:t>to take into account unbalanced classifier</a:t>
+              <a:t>Further adjustments to take into account unbalanced classifier</a:t>
             </a:r>
           </a:p>
           <a:p>
@@ -13471,11 +13422,7 @@
             </a:pPr>
             <a:r>
               <a:rPr lang="en-US" kern="0" dirty="0" smtClean="0"/>
-              <a:t>Only </a:t>
-            </a:r>
-            <a:r>
-              <a:rPr lang="en-US" kern="0" dirty="0" smtClean="0"/>
-              <a:t>analyze features </a:t>
+              <a:t>Only analyze features </a:t>
             </a:r>
             <a:r>
               <a:rPr lang="en-US" kern="0" dirty="0"/>
@@ -13503,7 +13450,6 @@
               <a:rPr lang="en-US" kern="0" dirty="0" smtClean="0"/>
               <a:t>data (heart disease, diabetes, asthma)</a:t>
             </a:r>
-            <a:endParaRPr lang="en-US" kern="0" dirty="0" smtClean="0"/>
           </a:p>
           <a:p>
             <a:pPr>
@@ -13572,7 +13518,6 @@
               <a:rPr lang="en-US" kern="0" dirty="0" smtClean="0"/>
               <a:t>Benchmarking datasets</a:t>
             </a:r>
-            <a:endParaRPr lang="en-US" kern="0" dirty="0" smtClean="0"/>
           </a:p>
           <a:p>
             <a:pPr marL="574675" lvl="2" indent="-228600" algn="l">
@@ -13804,11 +13749,7 @@
             </a:pPr>
             <a:r>
               <a:rPr lang="en-US" b="1" dirty="0" smtClean="0"/>
-              <a:t>Why</a:t>
-            </a:r>
-            <a:r>
-              <a:rPr lang="en-US" b="1" dirty="0" smtClean="0"/>
-              <a:t>?</a:t>
+              <a:t>Why?</a:t>
             </a:r>
           </a:p>
           <a:p>
@@ -13821,27 +13762,7 @@
             </a:pPr>
             <a:r>
               <a:rPr lang="en-US" dirty="0" smtClean="0"/>
-              <a:t>High </a:t>
-            </a:r>
-            <a:r>
-              <a:rPr lang="en-US" dirty="0" smtClean="0"/>
-              <a:t>utilizers of health </a:t>
-            </a:r>
-            <a:r>
-              <a:rPr lang="en-US" dirty="0" smtClean="0"/>
-              <a:t>could </a:t>
-            </a:r>
-            <a:r>
-              <a:rPr lang="en-US" dirty="0" smtClean="0"/>
-              <a:t>be placed in care management programs to improve a patient’s </a:t>
-            </a:r>
-            <a:r>
-              <a:rPr lang="en-US" dirty="0" smtClean="0"/>
-              <a:t>health/experience </a:t>
-            </a:r>
-            <a:r>
-              <a:rPr lang="en-US" dirty="0" smtClean="0"/>
-              <a:t>and reduce a health system’s cost</a:t>
+              <a:t>High utilizers of health could be placed in care management programs to improve a patient’s health/experience and reduce a health system’s cost</a:t>
             </a:r>
           </a:p>
         </p:txBody>
@@ -14528,7 +14449,7 @@
                 </a:solidFill>
                 <a:latin typeface="Helvetica Neue"/>
               </a:rPr>
-              <a:t>UCLA performs imputation so data is fairly ‘clean’</a:t>
+              <a:t>UCLA performs imputation so data is reasonably ‘clean’</a:t>
             </a:r>
           </a:p>
         </p:txBody>
@@ -15168,67 +15089,25 @@
                 </a:solidFill>
                 <a:latin typeface="Helvetica Neue"/>
               </a:rPr>
-              <a:t>extrapolate the sample to the </a:t>
-            </a:r>
-            <a:r>
-              <a:rPr lang="en-US" sz="1800" dirty="0" smtClean="0">
+              <a:t>extrapolate the sample to the population (adjust for sampling bias)</a:t>
+            </a:r>
+          </a:p>
+          <a:p>
+            <a:pPr>
+              <a:lnSpc>
+                <a:spcPct val="100000"/>
+              </a:lnSpc>
+              <a:buFont typeface="Arial" panose="020B0604020202020204" pitchFamily="34" charset="0"/>
+              <a:buChar char="•"/>
+            </a:pPr>
+            <a:r>
+              <a:rPr lang="en-US" sz="1800" kern="0" dirty="0" smtClean="0">
                 <a:solidFill>
                   <a:srgbClr val="000000"/>
                 </a:solidFill>
                 <a:latin typeface="Helvetica Neue"/>
               </a:rPr>
-              <a:t>population (adjust for sampling bias)</a:t>
-            </a:r>
-            <a:endParaRPr lang="en-US" sz="1800" dirty="0" smtClean="0">
-              <a:solidFill>
-                <a:srgbClr val="000000"/>
-              </a:solidFill>
-              <a:latin typeface="Helvetica Neue"/>
-            </a:endParaRPr>
-          </a:p>
-          <a:p>
-            <a:pPr>
-              <a:lnSpc>
-                <a:spcPct val="100000"/>
-              </a:lnSpc>
-              <a:buFont typeface="Arial" panose="020B0604020202020204" pitchFamily="34" charset="0"/>
-              <a:buChar char="•"/>
-            </a:pPr>
-            <a:r>
-              <a:rPr lang="en-US" sz="1800" kern="0" dirty="0" smtClean="0">
-                <a:solidFill>
-                  <a:srgbClr val="000000"/>
-                </a:solidFill>
-                <a:latin typeface="Helvetica Neue"/>
-              </a:rPr>
-              <a:t>A health system might not have access to all of </a:t>
-            </a:r>
-            <a:r>
-              <a:rPr lang="en-US" sz="1800" kern="0" dirty="0" smtClean="0">
-                <a:solidFill>
-                  <a:srgbClr val="000000"/>
-                </a:solidFill>
-                <a:latin typeface="Helvetica Neue"/>
-              </a:rPr>
-              <a:t>the </a:t>
-            </a:r>
-            <a:r>
-              <a:rPr lang="en-US" sz="1800" kern="0" dirty="0" smtClean="0">
-                <a:solidFill>
-                  <a:srgbClr val="000000"/>
-                </a:solidFill>
-                <a:latin typeface="Helvetica Neue"/>
-              </a:rPr>
-              <a:t>data </a:t>
-            </a:r>
-            <a:r>
-              <a:rPr lang="en-US" sz="1800" kern="0" dirty="0" smtClean="0">
-                <a:solidFill>
-                  <a:srgbClr val="000000"/>
-                </a:solidFill>
-                <a:latin typeface="Helvetica Neue"/>
-              </a:rPr>
-              <a:t>points when making predictions</a:t>
+              <a:t>A health system might not have access to all of the data points when making predictions</a:t>
             </a:r>
             <a:endParaRPr lang="en-US" sz="1800" kern="0" dirty="0" smtClean="0"/>
           </a:p>

</xml_diff>